<commit_message>
Missings and Outliers done
</commit_message>
<xml_diff>
--- a/Report.pptx
+++ b/Report.pptx
@@ -119,6 +119,11 @@
       </a:defRPr>
     </a:lvl9pPr>
   </p:defaultTextStyle>
+  <p:extLst>
+    <p:ext uri="{EFAFB233-063F-42B5-8137-9DF3F51BA10A}">
+      <p15:sldGuideLst xmlns:p15="http://schemas.microsoft.com/office/powerpoint/2012/main"/>
+    </p:ext>
+  </p:extLst>
 </p:presentation>
 </file>
 
@@ -269,7 +274,7 @@
           <a:p>
             <a:fld id="{97DBC102-9276-45BB-B360-46D8E32A348F}" type="datetimeFigureOut">
               <a:rPr lang="ca-ES" smtClean="0"/>
-              <a:t>9/11/2025</a:t>
+              <a:t>10/11/2025</a:t>
             </a:fld>
             <a:endParaRPr lang="ca-ES"/>
           </a:p>
@@ -467,7 +472,7 @@
           <a:p>
             <a:fld id="{97DBC102-9276-45BB-B360-46D8E32A348F}" type="datetimeFigureOut">
               <a:rPr lang="ca-ES" smtClean="0"/>
-              <a:t>9/11/2025</a:t>
+              <a:t>10/11/2025</a:t>
             </a:fld>
             <a:endParaRPr lang="ca-ES"/>
           </a:p>
@@ -675,7 +680,7 @@
           <a:p>
             <a:fld id="{97DBC102-9276-45BB-B360-46D8E32A348F}" type="datetimeFigureOut">
               <a:rPr lang="ca-ES" smtClean="0"/>
-              <a:t>9/11/2025</a:t>
+              <a:t>10/11/2025</a:t>
             </a:fld>
             <a:endParaRPr lang="ca-ES"/>
           </a:p>
@@ -873,7 +878,7 @@
           <a:p>
             <a:fld id="{97DBC102-9276-45BB-B360-46D8E32A348F}" type="datetimeFigureOut">
               <a:rPr lang="ca-ES" smtClean="0"/>
-              <a:t>9/11/2025</a:t>
+              <a:t>10/11/2025</a:t>
             </a:fld>
             <a:endParaRPr lang="ca-ES"/>
           </a:p>
@@ -1148,7 +1153,7 @@
           <a:p>
             <a:fld id="{97DBC102-9276-45BB-B360-46D8E32A348F}" type="datetimeFigureOut">
               <a:rPr lang="ca-ES" smtClean="0"/>
-              <a:t>9/11/2025</a:t>
+              <a:t>10/11/2025</a:t>
             </a:fld>
             <a:endParaRPr lang="ca-ES"/>
           </a:p>
@@ -1413,7 +1418,7 @@
           <a:p>
             <a:fld id="{97DBC102-9276-45BB-B360-46D8E32A348F}" type="datetimeFigureOut">
               <a:rPr lang="ca-ES" smtClean="0"/>
-              <a:t>9/11/2025</a:t>
+              <a:t>10/11/2025</a:t>
             </a:fld>
             <a:endParaRPr lang="ca-ES"/>
           </a:p>
@@ -1825,7 +1830,7 @@
           <a:p>
             <a:fld id="{97DBC102-9276-45BB-B360-46D8E32A348F}" type="datetimeFigureOut">
               <a:rPr lang="ca-ES" smtClean="0"/>
-              <a:t>9/11/2025</a:t>
+              <a:t>10/11/2025</a:t>
             </a:fld>
             <a:endParaRPr lang="ca-ES"/>
           </a:p>
@@ -1966,7 +1971,7 @@
           <a:p>
             <a:fld id="{97DBC102-9276-45BB-B360-46D8E32A348F}" type="datetimeFigureOut">
               <a:rPr lang="ca-ES" smtClean="0"/>
-              <a:t>9/11/2025</a:t>
+              <a:t>10/11/2025</a:t>
             </a:fld>
             <a:endParaRPr lang="ca-ES"/>
           </a:p>
@@ -2079,7 +2084,7 @@
           <a:p>
             <a:fld id="{97DBC102-9276-45BB-B360-46D8E32A348F}" type="datetimeFigureOut">
               <a:rPr lang="ca-ES" smtClean="0"/>
-              <a:t>9/11/2025</a:t>
+              <a:t>10/11/2025</a:t>
             </a:fld>
             <a:endParaRPr lang="ca-ES"/>
           </a:p>
@@ -2390,7 +2395,7 @@
           <a:p>
             <a:fld id="{97DBC102-9276-45BB-B360-46D8E32A348F}" type="datetimeFigureOut">
               <a:rPr lang="ca-ES" smtClean="0"/>
-              <a:t>9/11/2025</a:t>
+              <a:t>10/11/2025</a:t>
             </a:fld>
             <a:endParaRPr lang="ca-ES"/>
           </a:p>
@@ -2678,7 +2683,7 @@
           <a:p>
             <a:fld id="{97DBC102-9276-45BB-B360-46D8E32A348F}" type="datetimeFigureOut">
               <a:rPr lang="ca-ES" smtClean="0"/>
-              <a:t>9/11/2025</a:t>
+              <a:t>10/11/2025</a:t>
             </a:fld>
             <a:endParaRPr lang="ca-ES"/>
           </a:p>
@@ -2919,7 +2924,7 @@
           <a:p>
             <a:fld id="{97DBC102-9276-45BB-B360-46D8E32A348F}" type="datetimeFigureOut">
               <a:rPr lang="ca-ES" smtClean="0"/>
-              <a:t>9/11/2025</a:t>
+              <a:t>10/11/2025</a:t>
             </a:fld>
             <a:endParaRPr lang="ca-ES"/>
           </a:p>
@@ -3810,21 +3815,8 @@
           <a:p>
             <a:r>
               <a:rPr lang="ca-ES" dirty="0"/>
-              <a:t>KNN y </a:t>
-            </a:r>
-            <a:r>
-              <a:rPr lang="ca-ES" dirty="0" err="1"/>
-              <a:t>Naive</a:t>
-            </a:r>
-            <a:r>
-              <a:rPr lang="ca-ES" dirty="0"/>
-              <a:t> </a:t>
-            </a:r>
-            <a:r>
-              <a:rPr lang="ca-ES" dirty="0" err="1"/>
-              <a:t>Bayes</a:t>
-            </a:r>
-            <a:endParaRPr lang="ca-ES" dirty="0"/>
+              <a:t>KNN</a:t>
+            </a:r>
           </a:p>
         </p:txBody>
       </p:sp>
@@ -3906,21 +3898,8 @@
           <a:p>
             <a:r>
               <a:rPr lang="ca-ES" dirty="0"/>
-              <a:t>KNN y </a:t>
-            </a:r>
-            <a:r>
-              <a:rPr lang="ca-ES" dirty="0" err="1"/>
-              <a:t>Naive</a:t>
-            </a:r>
-            <a:r>
-              <a:rPr lang="ca-ES" dirty="0"/>
-              <a:t> </a:t>
-            </a:r>
-            <a:r>
-              <a:rPr lang="ca-ES" dirty="0" err="1"/>
-              <a:t>Bayes</a:t>
-            </a:r>
-            <a:endParaRPr lang="ca-ES" dirty="0"/>
+              <a:t>KNN</a:t>
+            </a:r>
           </a:p>
         </p:txBody>
       </p:sp>
@@ -6096,18 +6075,9 @@
           <a:lstStyle/>
           <a:p>
             <a:r>
-              <a:rPr lang="ca-ES" dirty="0" err="1"/>
-              <a:t>Missings</a:t>
-            </a:r>
-            <a:r>
               <a:rPr lang="ca-ES" dirty="0"/>
-              <a:t> y </a:t>
-            </a:r>
-            <a:r>
-              <a:rPr lang="ca-ES" dirty="0" err="1"/>
-              <a:t>Outliers</a:t>
-            </a:r>
-            <a:endParaRPr lang="ca-ES" dirty="0"/>
+              <a:t>Imputación en dos pasos</a:t>
+            </a:r>
           </a:p>
         </p:txBody>
       </p:sp>
@@ -6127,12 +6097,198 @@
             <p:ph idx="1"/>
           </p:nvPr>
         </p:nvSpPr>
-        <p:spPr/>
-        <p:txBody>
-          <a:bodyPr/>
-          <a:lstStyle/>
-          <a:p>
-            <a:endParaRPr lang="ca-ES"/>
+        <p:spPr>
+          <a:xfrm>
+            <a:off x="838201" y="1690689"/>
+            <a:ext cx="5146256" cy="4486274"/>
+          </a:xfrm>
+        </p:spPr>
+        <p:txBody>
+          <a:bodyPr>
+            <a:normAutofit/>
+          </a:bodyPr>
+          <a:lstStyle/>
+          <a:p>
+            <a:pPr marL="0" indent="0">
+              <a:buNone/>
+            </a:pPr>
+            <a:r>
+              <a:rPr lang="ca-ES" sz="2000" dirty="0"/>
+              <a:t>1. A partir del entendimiento del negocio i de </a:t>
+            </a:r>
+            <a:r>
+              <a:rPr lang="ca-ES" sz="2000" b="1" dirty="0"/>
+              <a:t>datos empíricos</a:t>
+            </a:r>
+            <a:r>
+              <a:rPr lang="ca-ES" sz="2000" dirty="0"/>
+              <a:t>, imputamos la modalidad.</a:t>
+            </a:r>
+          </a:p>
+          <a:p>
+            <a:pPr marL="0" indent="0" algn="ctr">
+              <a:buNone/>
+            </a:pPr>
+            <a:r>
+              <a:rPr lang="ca-ES" sz="1600" dirty="0">
+                <a:latin typeface="Source Code Pro" panose="020B0509030403020204" pitchFamily="49" charset="0"/>
+                <a:ea typeface="Source Code Pro" panose="020B0509030403020204" pitchFamily="49" charset="0"/>
+              </a:rPr>
+              <a:t>key -&gt; prob_major -&gt; audio_mode</a:t>
+            </a:r>
+          </a:p>
+          <a:p>
+            <a:pPr marL="514350" indent="-514350">
+              <a:buFont typeface="Arial" panose="020B0604020202020204" pitchFamily="34" charset="0"/>
+              <a:buAutoNum type="arabicPeriod"/>
+            </a:pPr>
+            <a:endParaRPr lang="ca-ES" sz="2000" dirty="0"/>
+          </a:p>
+          <a:p>
+            <a:pPr marL="0" indent="0">
+              <a:buNone/>
+            </a:pPr>
+            <a:r>
+              <a:rPr lang="ca-ES" sz="2000" dirty="0"/>
+              <a:t>2. Imputamos del resto de valores con </a:t>
+            </a:r>
+            <a:r>
+              <a:rPr lang="ca-ES" sz="2000" b="1" dirty="0"/>
+              <a:t>MICE</a:t>
+            </a:r>
+            <a:r>
+              <a:rPr lang="ca-ES" sz="2000" dirty="0"/>
+              <a:t>, usando una matriz de predictores personalizada i diferentes métodos:</a:t>
+            </a:r>
+          </a:p>
+          <a:p>
+            <a:pPr>
+              <a:buFontTx/>
+              <a:buChar char="-"/>
+            </a:pPr>
+            <a:r>
+              <a:rPr lang="ca-ES" sz="2000" dirty="0"/>
+              <a:t>Predictive Mean Matching (pmm)</a:t>
+            </a:r>
+          </a:p>
+          <a:p>
+            <a:pPr>
+              <a:buFontTx/>
+              <a:buChar char="-"/>
+            </a:pPr>
+            <a:r>
+              <a:rPr lang="ca-ES" sz="2000" dirty="0"/>
+              <a:t>Ranfom Forest (rf)</a:t>
+            </a:r>
+          </a:p>
+          <a:p>
+            <a:pPr>
+              <a:buFontTx/>
+              <a:buChar char="-"/>
+            </a:pPr>
+            <a:r>
+              <a:rPr lang="ca-ES" sz="2000" dirty="0"/>
+              <a:t>Regressión Lasso (lasso.norm)</a:t>
+            </a:r>
+          </a:p>
+          <a:p>
+            <a:pPr marL="0" indent="0">
+              <a:buNone/>
+            </a:pPr>
+            <a:endParaRPr lang="ca-ES" sz="2000" dirty="0"/>
+          </a:p>
+        </p:txBody>
+      </p:sp>
+      <p:pic>
+        <p:nvPicPr>
+          <p:cNvPr id="9" name="Picture 8" descr="A graph of different colored dots&#10;&#10;AI-generated content may be incorrect.">
+            <a:extLst>
+              <a:ext uri="{FF2B5EF4-FFF2-40B4-BE49-F238E27FC236}">
+                <a16:creationId xmlns:a16="http://schemas.microsoft.com/office/drawing/2014/main" id="{41C38051-4A9F-9D0F-0B0C-30CA15E1B5AC}"/>
+              </a:ext>
+            </a:extLst>
+          </p:cNvPr>
+          <p:cNvPicPr>
+            <a:picLocks noChangeAspect="1"/>
+          </p:cNvPicPr>
+          <p:nvPr/>
+        </p:nvPicPr>
+        <p:blipFill>
+          <a:blip r:embed="rId2">
+            <a:extLst>
+              <a:ext uri="{28A0092B-C50C-407E-A947-70E740481C1C}">
+                <a14:useLocalDpi xmlns:a14="http://schemas.microsoft.com/office/drawing/2010/main" val="0"/>
+              </a:ext>
+            </a:extLst>
+          </a:blip>
+          <a:stretch>
+            <a:fillRect/>
+          </a:stretch>
+        </p:blipFill>
+        <p:spPr>
+          <a:xfrm>
+            <a:off x="6096000" y="1529947"/>
+            <a:ext cx="5572875" cy="4839724"/>
+          </a:xfrm>
+          <a:prstGeom prst="rect">
+            <a:avLst/>
+          </a:prstGeom>
+        </p:spPr>
+      </p:pic>
+      <p:sp>
+        <p:nvSpPr>
+          <p:cNvPr id="10" name="Títol 1">
+            <a:extLst>
+              <a:ext uri="{FF2B5EF4-FFF2-40B4-BE49-F238E27FC236}">
+                <a16:creationId xmlns:a16="http://schemas.microsoft.com/office/drawing/2014/main" id="{A2F8ABFB-92DD-5E03-D185-EC6015165DAD}"/>
+              </a:ext>
+            </a:extLst>
+          </p:cNvPr>
+          <p:cNvSpPr txBox="1">
+            <a:spLocks/>
+          </p:cNvSpPr>
+          <p:nvPr/>
+        </p:nvSpPr>
+        <p:spPr>
+          <a:xfrm>
+            <a:off x="8393025" y="1173945"/>
+            <a:ext cx="1782110" cy="356002"/>
+          </a:xfrm>
+          <a:prstGeom prst="rect">
+            <a:avLst/>
+          </a:prstGeom>
+        </p:spPr>
+        <p:txBody>
+          <a:bodyPr vert="horz" lIns="91440" tIns="45720" rIns="91440" bIns="45720" rtlCol="0" anchor="ctr">
+            <a:noAutofit/>
+          </a:bodyPr>
+          <a:lstStyle>
+            <a:lvl1pPr algn="l" defTabSz="914400" rtl="0" eaLnBrk="1" latinLnBrk="0" hangingPunct="1">
+              <a:lnSpc>
+                <a:spcPct val="90000"/>
+              </a:lnSpc>
+              <a:spcBef>
+                <a:spcPct val="0"/>
+              </a:spcBef>
+              <a:buNone/>
+              <a:defRPr sz="4400" kern="1200">
+                <a:solidFill>
+                  <a:schemeClr val="tx1"/>
+                </a:solidFill>
+                <a:latin typeface="+mj-lt"/>
+                <a:ea typeface="+mj-ea"/>
+                <a:cs typeface="+mj-cs"/>
+              </a:defRPr>
+            </a:lvl1pPr>
+          </a:lstStyle>
+          <a:p>
+            <a:pPr algn="r"/>
+            <a:r>
+              <a:rPr lang="ca-ES" sz="1200" dirty="0">
+                <a:latin typeface="+mn-lt"/>
+              </a:rPr>
+              <a:t>Uno de los gráficos para verificar la imputación</a:t>
+            </a:r>
           </a:p>
         </p:txBody>
       </p:sp>
@@ -6188,18 +6344,9 @@
           <a:lstStyle/>
           <a:p>
             <a:r>
-              <a:rPr lang="ca-ES" dirty="0" err="1"/>
-              <a:t>Missings</a:t>
-            </a:r>
-            <a:r>
               <a:rPr lang="ca-ES" dirty="0"/>
-              <a:t> y </a:t>
-            </a:r>
-            <a:r>
-              <a:rPr lang="ca-ES" dirty="0" err="1"/>
               <a:t>Outliers</a:t>
             </a:r>
-            <a:endParaRPr lang="ca-ES" dirty="0"/>
           </a:p>
         </p:txBody>
       </p:sp>
@@ -6219,12 +6366,330 @@
             <p:ph idx="1"/>
           </p:nvPr>
         </p:nvSpPr>
-        <p:spPr/>
-        <p:txBody>
-          <a:bodyPr/>
-          <a:lstStyle/>
-          <a:p>
-            <a:endParaRPr lang="ca-ES"/>
+        <p:spPr>
+          <a:xfrm>
+            <a:off x="838200" y="1825625"/>
+            <a:ext cx="5364156" cy="4351338"/>
+          </a:xfrm>
+        </p:spPr>
+        <p:txBody>
+          <a:bodyPr>
+            <a:normAutofit/>
+          </a:bodyPr>
+          <a:lstStyle/>
+          <a:p>
+            <a:pPr marL="0" indent="0">
+              <a:buNone/>
+            </a:pPr>
+            <a:r>
+              <a:rPr lang="ca-ES" sz="2000" dirty="0"/>
+              <a:t>Para aprovechar la </a:t>
+            </a:r>
+            <a:r>
+              <a:rPr lang="ca-ES" sz="2000" b="1" dirty="0"/>
+              <a:t>fuerte relación </a:t>
+            </a:r>
+            <a:r>
+              <a:rPr lang="ca-ES" sz="2000" dirty="0"/>
+              <a:t>entre variables, se ha usado </a:t>
+            </a:r>
+            <a:r>
+              <a:rPr lang="ca-ES" sz="2000" b="1" dirty="0"/>
+              <a:t>ALSO </a:t>
+            </a:r>
+            <a:r>
+              <a:rPr lang="ca-ES" sz="2000" dirty="0"/>
+              <a:t>(Attribute Wise Learning Score for Outliers) para obtener un </a:t>
+            </a:r>
+            <a:r>
+              <a:rPr lang="ca-ES" sz="2000" i="1" dirty="0"/>
+              <a:t>score </a:t>
+            </a:r>
+            <a:r>
+              <a:rPr lang="ca-ES" sz="2000" dirty="0"/>
+              <a:t>para la mayoria de las variables. </a:t>
+            </a:r>
+          </a:p>
+          <a:p>
+            <a:pPr marL="0" indent="0">
+              <a:buNone/>
+            </a:pPr>
+            <a:r>
+              <a:rPr lang="ca-ES" sz="2000" dirty="0"/>
+              <a:t>También se han detectado anomalias en la relación </a:t>
+            </a:r>
+            <a:r>
+              <a:rPr lang="ca-ES" sz="2000" b="1" dirty="0"/>
+              <a:t>instrumentalness-speechiness</a:t>
+            </a:r>
+            <a:r>
+              <a:rPr lang="ca-ES" sz="2000" dirty="0"/>
+              <a:t>, que se han calificado como outliers, pues una canción no puede ser instrumental i contener voces a la vez. </a:t>
+            </a:r>
+          </a:p>
+          <a:p>
+            <a:pPr marL="0" indent="0">
+              <a:buNone/>
+            </a:pPr>
+            <a:r>
+              <a:rPr lang="ca-ES" sz="2000" dirty="0"/>
+              <a:t>Se han combinado los dos </a:t>
+            </a:r>
+            <a:r>
+              <a:rPr lang="ca-ES" sz="2000" i="1" dirty="0"/>
+              <a:t>scores</a:t>
+            </a:r>
+            <a:r>
+              <a:rPr lang="ca-ES" sz="2000" dirty="0"/>
+              <a:t> en uno, para usarlo como </a:t>
+            </a:r>
+            <a:r>
+              <a:rPr lang="ca-ES" sz="2000" b="1" dirty="0"/>
+              <a:t>peso</a:t>
+            </a:r>
+            <a:r>
+              <a:rPr lang="ca-ES" sz="2000" dirty="0"/>
+              <a:t> para los métodos de regresión.</a:t>
+            </a:r>
+          </a:p>
+        </p:txBody>
+      </p:sp>
+      <p:pic>
+        <p:nvPicPr>
+          <p:cNvPr id="7" name="Picture 6" descr="A graph of different sizes and colors&#10;&#10;AI-generated content may be incorrect.">
+            <a:extLst>
+              <a:ext uri="{FF2B5EF4-FFF2-40B4-BE49-F238E27FC236}">
+                <a16:creationId xmlns:a16="http://schemas.microsoft.com/office/drawing/2014/main" id="{F0B81BD4-01B6-CA9B-68A7-5ADA51AB4329}"/>
+              </a:ext>
+            </a:extLst>
+          </p:cNvPr>
+          <p:cNvPicPr>
+            <a:picLocks noChangeAspect="1"/>
+          </p:cNvPicPr>
+          <p:nvPr/>
+        </p:nvPicPr>
+        <p:blipFill>
+          <a:blip r:embed="rId2">
+            <a:extLst>
+              <a:ext uri="{28A0092B-C50C-407E-A947-70E740481C1C}">
+                <a14:useLocalDpi xmlns:a14="http://schemas.microsoft.com/office/drawing/2010/main" val="0"/>
+              </a:ext>
+            </a:extLst>
+          </a:blip>
+          <a:stretch>
+            <a:fillRect/>
+          </a:stretch>
+        </p:blipFill>
+        <p:spPr>
+          <a:xfrm>
+            <a:off x="6291849" y="1389895"/>
+            <a:ext cx="5431806" cy="4358365"/>
+          </a:xfrm>
+          <a:prstGeom prst="rect">
+            <a:avLst/>
+          </a:prstGeom>
+        </p:spPr>
+      </p:pic>
+      <p:sp>
+        <p:nvSpPr>
+          <p:cNvPr id="8" name="Contenidor de contingut 2">
+            <a:extLst>
+              <a:ext uri="{FF2B5EF4-FFF2-40B4-BE49-F238E27FC236}">
+                <a16:creationId xmlns:a16="http://schemas.microsoft.com/office/drawing/2014/main" id="{89BAC3D6-BEFE-46C8-45AA-25A177107D92}"/>
+              </a:ext>
+            </a:extLst>
+          </p:cNvPr>
+          <p:cNvSpPr txBox="1">
+            <a:spLocks/>
+          </p:cNvSpPr>
+          <p:nvPr/>
+        </p:nvSpPr>
+        <p:spPr>
+          <a:xfrm>
+            <a:off x="8666961" y="1109740"/>
+            <a:ext cx="1842742" cy="261026"/>
+          </a:xfrm>
+          <a:prstGeom prst="rect">
+            <a:avLst/>
+          </a:prstGeom>
+        </p:spPr>
+        <p:txBody>
+          <a:bodyPr vert="horz" lIns="91440" tIns="45720" rIns="91440" bIns="45720" rtlCol="0">
+            <a:normAutofit/>
+          </a:bodyPr>
+          <a:lstStyle>
+            <a:lvl1pPr marL="228600" indent="-228600" algn="l" defTabSz="914400" rtl="0" eaLnBrk="1" latinLnBrk="0" hangingPunct="1">
+              <a:lnSpc>
+                <a:spcPct val="90000"/>
+              </a:lnSpc>
+              <a:spcBef>
+                <a:spcPts val="1000"/>
+              </a:spcBef>
+              <a:buFont typeface="Arial" panose="020B0604020202020204" pitchFamily="34" charset="0"/>
+              <a:buChar char="•"/>
+              <a:defRPr sz="2800" kern="1200">
+                <a:solidFill>
+                  <a:schemeClr val="tx1"/>
+                </a:solidFill>
+                <a:latin typeface="+mn-lt"/>
+                <a:ea typeface="+mn-ea"/>
+                <a:cs typeface="+mn-cs"/>
+              </a:defRPr>
+            </a:lvl1pPr>
+            <a:lvl2pPr marL="685800" indent="-228600" algn="l" defTabSz="914400" rtl="0" eaLnBrk="1" latinLnBrk="0" hangingPunct="1">
+              <a:lnSpc>
+                <a:spcPct val="90000"/>
+              </a:lnSpc>
+              <a:spcBef>
+                <a:spcPts val="500"/>
+              </a:spcBef>
+              <a:buFont typeface="Arial" panose="020B0604020202020204" pitchFamily="34" charset="0"/>
+              <a:buChar char="•"/>
+              <a:defRPr sz="2400" kern="1200">
+                <a:solidFill>
+                  <a:schemeClr val="tx1"/>
+                </a:solidFill>
+                <a:latin typeface="+mn-lt"/>
+                <a:ea typeface="+mn-ea"/>
+                <a:cs typeface="+mn-cs"/>
+              </a:defRPr>
+            </a:lvl2pPr>
+            <a:lvl3pPr marL="1143000" indent="-228600" algn="l" defTabSz="914400" rtl="0" eaLnBrk="1" latinLnBrk="0" hangingPunct="1">
+              <a:lnSpc>
+                <a:spcPct val="90000"/>
+              </a:lnSpc>
+              <a:spcBef>
+                <a:spcPts val="500"/>
+              </a:spcBef>
+              <a:buFont typeface="Arial" panose="020B0604020202020204" pitchFamily="34" charset="0"/>
+              <a:buChar char="•"/>
+              <a:defRPr sz="2000" kern="1200">
+                <a:solidFill>
+                  <a:schemeClr val="tx1"/>
+                </a:solidFill>
+                <a:latin typeface="+mn-lt"/>
+                <a:ea typeface="+mn-ea"/>
+                <a:cs typeface="+mn-cs"/>
+              </a:defRPr>
+            </a:lvl3pPr>
+            <a:lvl4pPr marL="1600200" indent="-228600" algn="l" defTabSz="914400" rtl="0" eaLnBrk="1" latinLnBrk="0" hangingPunct="1">
+              <a:lnSpc>
+                <a:spcPct val="90000"/>
+              </a:lnSpc>
+              <a:spcBef>
+                <a:spcPts val="500"/>
+              </a:spcBef>
+              <a:buFont typeface="Arial" panose="020B0604020202020204" pitchFamily="34" charset="0"/>
+              <a:buChar char="•"/>
+              <a:defRPr sz="1800" kern="1200">
+                <a:solidFill>
+                  <a:schemeClr val="tx1"/>
+                </a:solidFill>
+                <a:latin typeface="+mn-lt"/>
+                <a:ea typeface="+mn-ea"/>
+                <a:cs typeface="+mn-cs"/>
+              </a:defRPr>
+            </a:lvl4pPr>
+            <a:lvl5pPr marL="2057400" indent="-228600" algn="l" defTabSz="914400" rtl="0" eaLnBrk="1" latinLnBrk="0" hangingPunct="1">
+              <a:lnSpc>
+                <a:spcPct val="90000"/>
+              </a:lnSpc>
+              <a:spcBef>
+                <a:spcPts val="500"/>
+              </a:spcBef>
+              <a:buFont typeface="Arial" panose="020B0604020202020204" pitchFamily="34" charset="0"/>
+              <a:buChar char="•"/>
+              <a:defRPr sz="1800" kern="1200">
+                <a:solidFill>
+                  <a:schemeClr val="tx1"/>
+                </a:solidFill>
+                <a:latin typeface="+mn-lt"/>
+                <a:ea typeface="+mn-ea"/>
+                <a:cs typeface="+mn-cs"/>
+              </a:defRPr>
+            </a:lvl5pPr>
+            <a:lvl6pPr marL="2514600" indent="-228600" algn="l" defTabSz="914400" rtl="0" eaLnBrk="1" latinLnBrk="0" hangingPunct="1">
+              <a:lnSpc>
+                <a:spcPct val="90000"/>
+              </a:lnSpc>
+              <a:spcBef>
+                <a:spcPts val="500"/>
+              </a:spcBef>
+              <a:buFont typeface="Arial" panose="020B0604020202020204" pitchFamily="34" charset="0"/>
+              <a:buChar char="•"/>
+              <a:defRPr sz="1800" kern="1200">
+                <a:solidFill>
+                  <a:schemeClr val="tx1"/>
+                </a:solidFill>
+                <a:latin typeface="+mn-lt"/>
+                <a:ea typeface="+mn-ea"/>
+                <a:cs typeface="+mn-cs"/>
+              </a:defRPr>
+            </a:lvl6pPr>
+            <a:lvl7pPr marL="2971800" indent="-228600" algn="l" defTabSz="914400" rtl="0" eaLnBrk="1" latinLnBrk="0" hangingPunct="1">
+              <a:lnSpc>
+                <a:spcPct val="90000"/>
+              </a:lnSpc>
+              <a:spcBef>
+                <a:spcPts val="500"/>
+              </a:spcBef>
+              <a:buFont typeface="Arial" panose="020B0604020202020204" pitchFamily="34" charset="0"/>
+              <a:buChar char="•"/>
+              <a:defRPr sz="1800" kern="1200">
+                <a:solidFill>
+                  <a:schemeClr val="tx1"/>
+                </a:solidFill>
+                <a:latin typeface="+mn-lt"/>
+                <a:ea typeface="+mn-ea"/>
+                <a:cs typeface="+mn-cs"/>
+              </a:defRPr>
+            </a:lvl7pPr>
+            <a:lvl8pPr marL="3429000" indent="-228600" algn="l" defTabSz="914400" rtl="0" eaLnBrk="1" latinLnBrk="0" hangingPunct="1">
+              <a:lnSpc>
+                <a:spcPct val="90000"/>
+              </a:lnSpc>
+              <a:spcBef>
+                <a:spcPts val="500"/>
+              </a:spcBef>
+              <a:buFont typeface="Arial" panose="020B0604020202020204" pitchFamily="34" charset="0"/>
+              <a:buChar char="•"/>
+              <a:defRPr sz="1800" kern="1200">
+                <a:solidFill>
+                  <a:schemeClr val="tx1"/>
+                </a:solidFill>
+                <a:latin typeface="+mn-lt"/>
+                <a:ea typeface="+mn-ea"/>
+                <a:cs typeface="+mn-cs"/>
+              </a:defRPr>
+            </a:lvl8pPr>
+            <a:lvl9pPr marL="3886200" indent="-228600" algn="l" defTabSz="914400" rtl="0" eaLnBrk="1" latinLnBrk="0" hangingPunct="1">
+              <a:lnSpc>
+                <a:spcPct val="90000"/>
+              </a:lnSpc>
+              <a:spcBef>
+                <a:spcPts val="500"/>
+              </a:spcBef>
+              <a:buFont typeface="Arial" panose="020B0604020202020204" pitchFamily="34" charset="0"/>
+              <a:buChar char="•"/>
+              <a:defRPr sz="1800" kern="1200">
+                <a:solidFill>
+                  <a:schemeClr val="tx1"/>
+                </a:solidFill>
+                <a:latin typeface="+mn-lt"/>
+                <a:ea typeface="+mn-ea"/>
+                <a:cs typeface="+mn-cs"/>
+              </a:defRPr>
+            </a:lvl9pPr>
+          </a:lstStyle>
+          <a:p>
+            <a:pPr marL="0" indent="0" algn="r">
+              <a:buFont typeface="Arial" panose="020B0604020202020204" pitchFamily="34" charset="0"/>
+              <a:buNone/>
+            </a:pPr>
+            <a:r>
+              <a:rPr lang="ca-ES" sz="1200" i="1" dirty="0"/>
+              <a:t>outlier score combinado</a:t>
+            </a:r>
           </a:p>
         </p:txBody>
       </p:sp>

</xml_diff>

<commit_message>
Added link to repository
</commit_message>
<xml_diff>
--- a/Report.pptx
+++ b/Report.pptx
@@ -3385,12 +3385,41 @@
             <p:ph type="subTitle" idx="1"/>
           </p:nvPr>
         </p:nvSpPr>
-        <p:spPr/>
-        <p:txBody>
-          <a:bodyPr/>
-          <a:lstStyle/>
-          <a:p>
-            <a:endParaRPr lang="ca-ES"/>
+        <p:spPr>
+          <a:xfrm>
+            <a:off x="1524000" y="3602038"/>
+            <a:ext cx="9144000" cy="3039394"/>
+          </a:xfrm>
+        </p:spPr>
+        <p:txBody>
+          <a:bodyPr>
+            <a:normAutofit/>
+          </a:bodyPr>
+          <a:lstStyle/>
+          <a:p>
+            <a:r>
+              <a:rPr lang="ca-ES" dirty="0"/>
+              <a:t>Grupo 03</a:t>
+            </a:r>
+          </a:p>
+          <a:p>
+            <a:r>
+              <a:rPr lang="ca-ES" dirty="0"/>
+              <a:t>Kaggle: Grupo 03</a:t>
+            </a:r>
+          </a:p>
+          <a:p>
+            <a:r>
+              <a:rPr lang="ca-ES" dirty="0"/>
+              <a:t>Github: </a:t>
+            </a:r>
+            <a:r>
+              <a:rPr lang="ca-ES" dirty="0">
+                <a:hlinkClick r:id="rId2"/>
+              </a:rPr>
+              <a:t>https://github.com/benet1one/Mineria</a:t>
+            </a:r>
+            <a:endParaRPr lang="ca-ES" dirty="0"/>
           </a:p>
         </p:txBody>
       </p:sp>

</xml_diff>